<commit_message>
Exam cheatsheets, unmodified from here on as I've finished my examsgit push
</commit_message>
<xml_diff>
--- a/Networks_Cheatsheet.pptx
+++ b/Networks_Cheatsheet.pptx
@@ -198,7 +198,7 @@
           <a:p>
             <a:fld id="{20D0BC4A-03AE-4C2C-9950-208B1D736A90}" type="datetimeFigureOut">
               <a:rPr lang="en-GB" smtClean="0"/>
-              <a:t>26/04/2023</a:t>
+              <a:t>29/04/2023</a:t>
             </a:fld>
             <a:endParaRPr lang="en-GB"/>
           </a:p>
@@ -681,7 +681,7 @@
           <a:p>
             <a:fld id="{FCB962C0-234D-4A61-9811-E465706684CD}" type="datetimeFigureOut">
               <a:rPr lang="en-GB" smtClean="0"/>
-              <a:t>26/04/2023</a:t>
+              <a:t>29/04/2023</a:t>
             </a:fld>
             <a:endParaRPr lang="en-GB"/>
           </a:p>
@@ -851,7 +851,7 @@
           <a:p>
             <a:fld id="{FCB962C0-234D-4A61-9811-E465706684CD}" type="datetimeFigureOut">
               <a:rPr lang="en-GB" smtClean="0"/>
-              <a:t>26/04/2023</a:t>
+              <a:t>29/04/2023</a:t>
             </a:fld>
             <a:endParaRPr lang="en-GB"/>
           </a:p>
@@ -1031,7 +1031,7 @@
           <a:p>
             <a:fld id="{FCB962C0-234D-4A61-9811-E465706684CD}" type="datetimeFigureOut">
               <a:rPr lang="en-GB" smtClean="0"/>
-              <a:t>26/04/2023</a:t>
+              <a:t>29/04/2023</a:t>
             </a:fld>
             <a:endParaRPr lang="en-GB"/>
           </a:p>
@@ -1201,7 +1201,7 @@
           <a:p>
             <a:fld id="{FCB962C0-234D-4A61-9811-E465706684CD}" type="datetimeFigureOut">
               <a:rPr lang="en-GB" smtClean="0"/>
-              <a:t>26/04/2023</a:t>
+              <a:t>29/04/2023</a:t>
             </a:fld>
             <a:endParaRPr lang="en-GB"/>
           </a:p>
@@ -1445,7 +1445,7 @@
           <a:p>
             <a:fld id="{FCB962C0-234D-4A61-9811-E465706684CD}" type="datetimeFigureOut">
               <a:rPr lang="en-GB" smtClean="0"/>
-              <a:t>26/04/2023</a:t>
+              <a:t>29/04/2023</a:t>
             </a:fld>
             <a:endParaRPr lang="en-GB"/>
           </a:p>
@@ -1677,7 +1677,7 @@
           <a:p>
             <a:fld id="{FCB962C0-234D-4A61-9811-E465706684CD}" type="datetimeFigureOut">
               <a:rPr lang="en-GB" smtClean="0"/>
-              <a:t>26/04/2023</a:t>
+              <a:t>29/04/2023</a:t>
             </a:fld>
             <a:endParaRPr lang="en-GB"/>
           </a:p>
@@ -2044,7 +2044,7 @@
           <a:p>
             <a:fld id="{FCB962C0-234D-4A61-9811-E465706684CD}" type="datetimeFigureOut">
               <a:rPr lang="en-GB" smtClean="0"/>
-              <a:t>26/04/2023</a:t>
+              <a:t>29/04/2023</a:t>
             </a:fld>
             <a:endParaRPr lang="en-GB"/>
           </a:p>
@@ -2162,7 +2162,7 @@
           <a:p>
             <a:fld id="{FCB962C0-234D-4A61-9811-E465706684CD}" type="datetimeFigureOut">
               <a:rPr lang="en-GB" smtClean="0"/>
-              <a:t>26/04/2023</a:t>
+              <a:t>29/04/2023</a:t>
             </a:fld>
             <a:endParaRPr lang="en-GB"/>
           </a:p>
@@ -2257,7 +2257,7 @@
           <a:p>
             <a:fld id="{FCB962C0-234D-4A61-9811-E465706684CD}" type="datetimeFigureOut">
               <a:rPr lang="en-GB" smtClean="0"/>
-              <a:t>26/04/2023</a:t>
+              <a:t>29/04/2023</a:t>
             </a:fld>
             <a:endParaRPr lang="en-GB"/>
           </a:p>
@@ -2534,7 +2534,7 @@
           <a:p>
             <a:fld id="{FCB962C0-234D-4A61-9811-E465706684CD}" type="datetimeFigureOut">
               <a:rPr lang="en-GB" smtClean="0"/>
-              <a:t>26/04/2023</a:t>
+              <a:t>29/04/2023</a:t>
             </a:fld>
             <a:endParaRPr lang="en-GB"/>
           </a:p>
@@ -2791,7 +2791,7 @@
           <a:p>
             <a:fld id="{FCB962C0-234D-4A61-9811-E465706684CD}" type="datetimeFigureOut">
               <a:rPr lang="en-GB" smtClean="0"/>
-              <a:t>26/04/2023</a:t>
+              <a:t>29/04/2023</a:t>
             </a:fld>
             <a:endParaRPr lang="en-GB"/>
           </a:p>
@@ -3004,7 +3004,7 @@
           <a:p>
             <a:fld id="{FCB962C0-234D-4A61-9811-E465706684CD}" type="datetimeFigureOut">
               <a:rPr lang="en-GB" smtClean="0"/>
-              <a:t>26/04/2023</a:t>
+              <a:t>29/04/2023</a:t>
             </a:fld>
             <a:endParaRPr lang="en-GB"/>
           </a:p>
@@ -22604,7 +22604,7 @@
         </p:blipFill>
         <p:spPr>
           <a:xfrm>
-            <a:off x="3822427" y="6000944"/>
+            <a:off x="3837569" y="5794358"/>
             <a:ext cx="584504" cy="283078"/>
           </a:xfrm>
           <a:prstGeom prst="rect">
@@ -22633,7 +22633,7 @@
         </p:blipFill>
         <p:spPr>
           <a:xfrm>
-            <a:off x="4384512" y="6000944"/>
+            <a:off x="4401923" y="5794358"/>
             <a:ext cx="595313" cy="283078"/>
           </a:xfrm>
           <a:prstGeom prst="rect">
@@ -22663,7 +22663,7 @@
         </p:blipFill>
         <p:spPr>
           <a:xfrm>
-            <a:off x="4957407" y="6000944"/>
+            <a:off x="4960324" y="5794358"/>
             <a:ext cx="548386" cy="283078"/>
           </a:xfrm>
           <a:prstGeom prst="rect">

</xml_diff>